<commit_message>
updated problem statement, capstone 2 all loading now done by looping
</commit_message>
<xml_diff>
--- a/Capstone Two/Capstone Two Problem Statement.pptx
+++ b/Capstone Two/Capstone Two Problem Statement.pptx
@@ -257,7 +257,7 @@
       </p15:sldGuideLst>
     </p:ext>
     <p:ext uri="http://customooxmlschemas.google.com/">
-      <go:slidesCustomData xmlns="" xmlns:mc="http://schemas.openxmlformats.org/markup-compatibility/2006" xmlns:mv="urn:schemas-microsoft-com:mac:vml" xmlns:c="http://schemas.openxmlformats.org/drawingml/2006/chart" xmlns:dgm="http://schemas.openxmlformats.org/drawingml/2006/diagram" xmlns:o="urn:schemas-microsoft-com:office:office" xmlns:v="urn:schemas-microsoft-com:vml" xmlns:pvml="urn:schemas-microsoft-com:office:powerpoint" xmlns:com="http://schemas.openxmlformats.org/drawingml/2006/compatibility" xmlns:p14="http://schemas.microsoft.com/office/powerpoint/2010/main" xmlns:p15="http://schemas.microsoft.com/office/powerpoint/2012/main" xmlns:go="http://customooxmlschemas.google.com/" r:id="rId7" roundtripDataSignature="AMtx7mjdo7FECp685JsX7/4pIVeoAktjNA=="/>
+      <go:slidesCustomData xmlns:go="http://customooxmlschemas.google.com/" xmlns:p15="http://schemas.microsoft.com/office/powerpoint/2012/main" xmlns:p14="http://schemas.microsoft.com/office/powerpoint/2010/main" xmlns:com="http://schemas.openxmlformats.org/drawingml/2006/compatibility" xmlns:pvml="urn:schemas-microsoft-com:office:powerpoint" xmlns:v="urn:schemas-microsoft-com:vml" xmlns:o="urn:schemas-microsoft-com:office:office" xmlns:dgm="http://schemas.openxmlformats.org/drawingml/2006/diagram" xmlns:c="http://schemas.openxmlformats.org/drawingml/2006/chart" xmlns:mv="urn:schemas-microsoft-com:mac:vml" xmlns:mc="http://schemas.openxmlformats.org/markup-compatibility/2006" xmlns="" r:id="rId7" roundtripDataSignature="AMtx7mjdo7FECp685JsX7/4pIVeoAktjNA=="/>
     </p:ext>
   </p:extLst>
 </p:presentation>
@@ -4230,8 +4230,8 @@
         </p:nvSpPr>
         <p:spPr>
           <a:xfrm>
-            <a:off x="218936" y="3207096"/>
-            <a:ext cx="288315" cy="288315"/>
+            <a:off x="239510" y="3616915"/>
+            <a:ext cx="267039" cy="288583"/>
           </a:xfrm>
           <a:prstGeom prst="rect">
             <a:avLst/>
@@ -4267,7 +4267,7 @@
               <a:buNone/>
             </a:pPr>
             <a:r>
-              <a:rPr lang="en-AU" sz="1428" b="0" i="0" u="none" strike="noStrike" cap="none">
+              <a:rPr lang="en-AU" sz="1428" b="0" i="0" u="none" strike="noStrike" cap="none" dirty="0">
                 <a:solidFill>
                   <a:schemeClr val="lt1"/>
                 </a:solidFill>
@@ -4278,7 +4278,7 @@
               </a:rPr>
               <a:t>2</a:t>
             </a:r>
-            <a:endParaRPr sz="1400" b="0" i="0" u="none" strike="noStrike" cap="none">
+            <a:endParaRPr sz="1400" b="0" i="0" u="none" strike="noStrike" cap="none" dirty="0">
               <a:solidFill>
                 <a:srgbClr val="000000"/>
               </a:solidFill>
@@ -4298,7 +4298,7 @@
         </p:nvSpPr>
         <p:spPr>
           <a:xfrm>
-            <a:off x="601195" y="3239152"/>
+            <a:off x="517188" y="3669489"/>
             <a:ext cx="3597454" cy="224203"/>
           </a:xfrm>
           <a:prstGeom prst="rect">
@@ -4333,7 +4333,7 @@
               <a:buNone/>
             </a:pPr>
             <a:r>
-              <a:rPr lang="en-AU" sz="1428" b="0" i="0" u="none" strike="noStrike" cap="none">
+              <a:rPr lang="en-AU" sz="1428" b="0" i="0" u="none" strike="noStrike" cap="none" dirty="0">
                 <a:solidFill>
                   <a:schemeClr val="dk1"/>
                 </a:solidFill>
@@ -4344,7 +4344,7 @@
               </a:rPr>
               <a:t>Criteria for success</a:t>
             </a:r>
-            <a:endParaRPr sz="1400" b="0" i="0" u="none" strike="noStrike" cap="none">
+            <a:endParaRPr sz="1400" b="0" i="0" u="none" strike="noStrike" cap="none" dirty="0">
               <a:solidFill>
                 <a:srgbClr val="000000"/>
               </a:solidFill>
@@ -4430,7 +4430,7 @@
         </p:nvSpPr>
         <p:spPr>
           <a:xfrm>
-            <a:off x="218936" y="4221724"/>
+            <a:off x="228873" y="4665399"/>
             <a:ext cx="288315" cy="288315"/>
           </a:xfrm>
           <a:prstGeom prst="rect">
@@ -4566,7 +4566,7 @@
         </p:nvSpPr>
         <p:spPr>
           <a:xfrm>
-            <a:off x="601195" y="4223956"/>
+            <a:off x="550325" y="4740979"/>
             <a:ext cx="3597454" cy="219740"/>
           </a:xfrm>
           <a:prstGeom prst="rect">
@@ -4737,9 +4737,44 @@
             </a:pPr>
             <a:r>
               <a:rPr lang="en-AU" sz="1070" b="1" dirty="0"/>
-              <a:t>Boba joints are popular in the Bay Area that attracts students from middle school to grad school. Due to the majority of the customer database being students, it is only natural to find out what will be the most optimal seasonal scheduled hours for staff members and store operation.</a:t>
+              <a:t>Boba joints are popular in the Bay. The store owner would like to find out if time is the current store operating hours for all seasons, or should the store have seasonal hours to improve profit by 10% or more.</a:t>
             </a:r>
-            <a:endParaRPr dirty="0"/>
+          </a:p>
+          <a:p>
+            <a:pPr marL="0" marR="0" lvl="0" indent="0" algn="l" rtl="0">
+              <a:lnSpc>
+                <a:spcPct val="100000"/>
+              </a:lnSpc>
+              <a:spcBef>
+                <a:spcPts val="0"/>
+              </a:spcBef>
+              <a:spcAft>
+                <a:spcPts val="0"/>
+              </a:spcAft>
+              <a:buNone/>
+            </a:pPr>
+            <a:r>
+              <a:rPr lang="en-AU" sz="1070" b="1" dirty="0"/>
+              <a:t>Null: All sales are due to chance, time is not a dependent variable for sales.</a:t>
+            </a:r>
+          </a:p>
+          <a:p>
+            <a:pPr marL="0" marR="0" lvl="0" indent="0" algn="l" rtl="0">
+              <a:lnSpc>
+                <a:spcPct val="100000"/>
+              </a:lnSpc>
+              <a:spcBef>
+                <a:spcPts val="0"/>
+              </a:spcBef>
+              <a:spcAft>
+                <a:spcPts val="0"/>
+              </a:spcAft>
+              <a:buNone/>
+            </a:pPr>
+            <a:r>
+              <a:rPr lang="en-AU" sz="1070" b="1" dirty="0"/>
+              <a:t>Alternative: Time can be used to predict sales, and thus the store should operate based on times that produce profit.</a:t>
+            </a:r>
           </a:p>
         </p:txBody>
       </p:sp>
@@ -4751,7 +4786,7 @@
         </p:nvSpPr>
         <p:spPr>
           <a:xfrm>
-            <a:off x="143108" y="3538874"/>
+            <a:off x="152046" y="3852923"/>
             <a:ext cx="4324418" cy="751489"/>
           </a:xfrm>
           <a:prstGeom prst="rect">
@@ -4790,7 +4825,27 @@
                 <a:cs typeface="Arial"/>
                 <a:sym typeface="Arial"/>
               </a:rPr>
-              <a:t>New staffing schedules for 3 to 4 seasons over the year in hourly basis and/or new store operation hours should be implemented before the schools start again.</a:t>
+              <a:t>Find out if time is a good variable to predict sales, if it </a:t>
+            </a:r>
+            <a:r>
+              <a:rPr lang="en-US" sz="1071" b="1" dirty="0"/>
+              <a:t>is</a:t>
+            </a:r>
+            <a:r>
+              <a:rPr lang="en-US" sz="1071" b="1" i="0" u="none" strike="noStrike" cap="none" dirty="0">
+                <a:solidFill>
+                  <a:srgbClr val="000000"/>
+                </a:solidFill>
+                <a:latin typeface="Arial"/>
+                <a:ea typeface="Arial"/>
+                <a:cs typeface="Arial"/>
+                <a:sym typeface="Arial"/>
+              </a:rPr>
+              <a:t>, a new store operation hours should be implemented before the schools start again</a:t>
+            </a:r>
+            <a:r>
+              <a:rPr lang="en-US" sz="1071" b="1" dirty="0"/>
+              <a:t>, along with staff recommendation.</a:t>
             </a:r>
             <a:endParaRPr sz="1071" b="1" i="0" u="none" strike="noStrike" cap="none" dirty="0">
               <a:solidFill>
@@ -4812,8 +4867,8 @@
         </p:nvSpPr>
         <p:spPr>
           <a:xfrm>
-            <a:off x="186843" y="4597469"/>
-            <a:ext cx="4324418" cy="1336606"/>
+            <a:off x="186843" y="4999594"/>
+            <a:ext cx="4324418" cy="1137079"/>
           </a:xfrm>
           <a:prstGeom prst="rect">
             <a:avLst/>
@@ -4832,7 +4887,7 @@
             <a:pPr lvl="0"/>
             <a:r>
               <a:rPr lang="en-US" sz="1071" b="1" dirty="0"/>
-              <a:t>Use the data provided to find out the optimal open/close hours, and staffing for maximum efficiency of staff members. A staff member must be in store one and half hour before store opens for prepping, and closing shift must stay another half an hour after closing hour for clean ups. Rule of thumb, for each $100 sales, only one staff member is needed, but at no time should the store have only one staff member working. If the hourly sales doesn’t reach $50, the store will be losing money.</a:t>
+              <a:t>Use the 2017 hourly sale data provided to find if time is a good variable to predict sales. If it is, provide the optimal open/close hours, and staffing. Note: for each $50 sales, only one staff member is needed, but at no time should the store have only one staff member working. If the hourly sales doesn’t reach $40, the store will be losing money, and should be closed.</a:t>
             </a:r>
           </a:p>
         </p:txBody>
@@ -4876,37 +4931,7 @@
             </a:pPr>
             <a:r>
               <a:rPr lang="en-AU" sz="1070" b="1" dirty="0"/>
-              <a:t>-Since most of staff members are students, they would like to work 4~8 hour shifts only. </a:t>
-            </a:r>
-          </a:p>
-          <a:p>
-            <a:pPr marL="0" marR="0" lvl="0" indent="0" algn="l" rtl="0">
-              <a:lnSpc>
-                <a:spcPct val="100000"/>
-              </a:lnSpc>
-              <a:spcBef>
-                <a:spcPts val="0"/>
-              </a:spcBef>
-              <a:spcAft>
-                <a:spcPts val="0"/>
-              </a:spcAft>
-              <a:buNone/>
-            </a:pPr>
-            <a:r>
-              <a:rPr lang="en-AU" sz="1070" b="1" i="0" u="none" strike="noStrike" cap="none" dirty="0">
-                <a:solidFill>
-                  <a:srgbClr val="000000"/>
-                </a:solidFill>
-                <a:latin typeface="Arial"/>
-                <a:ea typeface="Arial"/>
-                <a:cs typeface="Arial"/>
-                <a:sym typeface="Arial"/>
-              </a:rPr>
-              <a:t>-By law, working shifts with</a:t>
-            </a:r>
-            <a:r>
-              <a:rPr lang="en-AU" sz="1070" b="1" dirty="0"/>
-              <a:t> 6 or more hours is required to take a 30-minute non-paid break.</a:t>
+              <a:t>-Since most of staff members are students, they would like to work 4~8 hour shifts only. So the staffing must be aware of the 4 hour minimum.</a:t>
             </a:r>
             <a:endParaRPr sz="1070" b="1" i="0" u="none" strike="noStrike" cap="none" dirty="0">
               <a:solidFill>
@@ -5580,7 +5605,7 @@
               <a:buNone/>
             </a:pPr>
             <a:r>
-              <a:rPr lang="en-AU" sz="1071" b="0" i="0" u="none" strike="noStrike" cap="none" dirty="0">
+              <a:rPr lang="en-AU" sz="1071" b="1" i="0" u="none" strike="noStrike" cap="none" dirty="0">
                 <a:solidFill>
                   <a:srgbClr val="000000"/>
                 </a:solidFill>
@@ -5592,7 +5617,7 @@
               <a:t>Store Owner</a:t>
             </a:r>
             <a:br>
-              <a:rPr lang="en-AU" sz="1071" b="0" i="0" u="none" strike="noStrike" cap="none" dirty="0">
+              <a:rPr lang="en-AU" sz="1071" b="1" i="0" u="none" strike="noStrike" cap="none" dirty="0">
                 <a:solidFill>
                   <a:srgbClr val="000000"/>
                 </a:solidFill>
@@ -5603,7 +5628,7 @@
               </a:rPr>
             </a:br>
             <a:r>
-              <a:rPr lang="en-AU" sz="1071" b="0" i="0" u="none" strike="noStrike" cap="none" dirty="0">
+              <a:rPr lang="en-AU" sz="1071" b="1" i="0" u="none" strike="noStrike" cap="none" dirty="0">
                 <a:solidFill>
                   <a:srgbClr val="000000"/>
                 </a:solidFill>
@@ -5615,7 +5640,7 @@
               <a:t>Store Manager</a:t>
             </a:r>
             <a:br>
-              <a:rPr lang="en-AU" sz="1071" b="0" i="0" u="none" strike="noStrike" cap="none" dirty="0">
+              <a:rPr lang="en-AU" sz="1071" b="1" i="0" u="none" strike="noStrike" cap="none" dirty="0">
                 <a:solidFill>
                   <a:srgbClr val="000000"/>
                 </a:solidFill>
@@ -5626,7 +5651,7 @@
               </a:rPr>
             </a:br>
             <a:r>
-              <a:rPr lang="en-AU" sz="1071" b="0" i="0" u="none" strike="noStrike" cap="none" dirty="0">
+              <a:rPr lang="en-AU" sz="1071" b="1" i="0" u="none" strike="noStrike" cap="none" dirty="0">
                 <a:solidFill>
                   <a:srgbClr val="000000"/>
                 </a:solidFill>
@@ -5692,19 +5717,7 @@
                 <a:cs typeface="Arial"/>
                 <a:sym typeface="Arial"/>
               </a:rPr>
-              <a:t>Can Super Cue Café use a new store operation hours and/or provide a new seasonal staff schedule to yield more than 10% yearly net revenue </a:t>
-            </a:r>
-            <a:r>
-              <a:rPr lang="en-AU" sz="1400" b="1" i="0" u="none" strike="noStrike" cap="none">
-                <a:solidFill>
-                  <a:srgbClr val="000000"/>
-                </a:solidFill>
-                <a:latin typeface="Arial"/>
-                <a:ea typeface="Arial"/>
-                <a:cs typeface="Arial"/>
-                <a:sym typeface="Arial"/>
-              </a:rPr>
-              <a:t>than previous year?</a:t>
+              <a:t>Can Super Cue Café store yield more than 10% profit than previous year by implementing seasonal hours?</a:t>
             </a:r>
             <a:endParaRPr sz="1400" b="1" i="0" u="none" strike="noStrike" cap="none" dirty="0">
               <a:solidFill>

</xml_diff>

<commit_message>
starting finalized code for CS 2
</commit_message>
<xml_diff>
--- a/Capstone Two/Capstone Two Problem Statement.pptx
+++ b/Capstone Two/Capstone Two Problem Statement.pptx
@@ -11,7 +11,7 @@
     <p:sldId id="256" r:id="rId2"/>
   </p:sldIdLst>
   <p:sldSz cx="9144000" cy="6858000" type="screen4x3"/>
-  <p:notesSz cx="6858000" cy="9144000"/>
+  <p:notesSz cx="7104063" cy="10234613"/>
   <p:defaultTextStyle>
     <a:defPPr marR="0" lvl="0" algn="l" rtl="0">
       <a:lnSpc>
@@ -257,7 +257,7 @@
       </p15:sldGuideLst>
     </p:ext>
     <p:ext uri="http://customooxmlschemas.google.com/">
-      <go:slidesCustomData xmlns:go="http://customooxmlschemas.google.com/" xmlns:p15="http://schemas.microsoft.com/office/powerpoint/2012/main" xmlns:p14="http://schemas.microsoft.com/office/powerpoint/2010/main" xmlns:com="http://schemas.openxmlformats.org/drawingml/2006/compatibility" xmlns:pvml="urn:schemas-microsoft-com:office:powerpoint" xmlns:v="urn:schemas-microsoft-com:vml" xmlns:o="urn:schemas-microsoft-com:office:office" xmlns:dgm="http://schemas.openxmlformats.org/drawingml/2006/diagram" xmlns:c="http://schemas.openxmlformats.org/drawingml/2006/chart" xmlns:mv="urn:schemas-microsoft-com:mac:vml" xmlns:mc="http://schemas.openxmlformats.org/markup-compatibility/2006" xmlns="" r:id="rId7" roundtripDataSignature="AMtx7mjdo7FECp685JsX7/4pIVeoAktjNA=="/>
+      <go:slidesCustomData xmlns="" xmlns:mc="http://schemas.openxmlformats.org/markup-compatibility/2006" xmlns:mv="urn:schemas-microsoft-com:mac:vml" xmlns:c="http://schemas.openxmlformats.org/drawingml/2006/chart" xmlns:dgm="http://schemas.openxmlformats.org/drawingml/2006/diagram" xmlns:o="urn:schemas-microsoft-com:office:office" xmlns:v="urn:schemas-microsoft-com:vml" xmlns:pvml="urn:schemas-microsoft-com:office:powerpoint" xmlns:com="http://schemas.openxmlformats.org/drawingml/2006/compatibility" xmlns:p14="http://schemas.microsoft.com/office/powerpoint/2010/main" xmlns:p15="http://schemas.microsoft.com/office/powerpoint/2012/main" xmlns:go="http://customooxmlschemas.google.com/" r:id="rId7" roundtripDataSignature="AMtx7mjdo7FECp685JsX7/4pIVeoAktjNA=="/>
     </p:ext>
   </p:extLst>
 </p:presentation>
@@ -301,7 +301,7 @@
         <p:spPr>
           <a:xfrm>
             <a:off x="0" y="0"/>
-            <a:ext cx="2971800" cy="457200"/>
+            <a:ext cx="3078427" cy="511731"/>
           </a:xfrm>
           <a:prstGeom prst="rect">
             <a:avLst/>
@@ -312,7 +312,7 @@
           </a:ln>
         </p:spPr>
         <p:txBody>
-          <a:bodyPr spcFirstLastPara="1" wrap="square" lIns="91425" tIns="45700" rIns="91425" bIns="45700" anchor="t" anchorCtr="0">
+          <a:bodyPr spcFirstLastPara="1" wrap="square" lIns="99059" tIns="49516" rIns="99059" bIns="49516" anchor="t" anchorCtr="0">
             <a:noAutofit/>
           </a:bodyPr>
           <a:lstStyle>
@@ -332,7 +332,7 @@
               <a:buSzPts val="1400"/>
               <a:buFont typeface="Arial"/>
               <a:buNone/>
-              <a:defRPr sz="1200" b="0" i="0" u="none" strike="noStrike" cap="none">
+              <a:defRPr sz="1300" b="0" i="0" u="none" strike="noStrike" cap="none">
                 <a:solidFill>
                   <a:schemeClr val="dk1"/>
                 </a:solidFill>
@@ -358,7 +358,7 @@
               <a:buSzPts val="1400"/>
               <a:buFont typeface="Arial"/>
               <a:buNone/>
-              <a:defRPr sz="1800" b="0" i="0" u="none" strike="noStrike" cap="none">
+              <a:defRPr sz="2000" b="0" i="0" u="none" strike="noStrike" cap="none">
                 <a:solidFill>
                   <a:schemeClr val="dk1"/>
                 </a:solidFill>
@@ -384,7 +384,7 @@
               <a:buSzPts val="1400"/>
               <a:buFont typeface="Arial"/>
               <a:buNone/>
-              <a:defRPr sz="1800" b="0" i="0" u="none" strike="noStrike" cap="none">
+              <a:defRPr sz="2000" b="0" i="0" u="none" strike="noStrike" cap="none">
                 <a:solidFill>
                   <a:schemeClr val="dk1"/>
                 </a:solidFill>
@@ -410,7 +410,7 @@
               <a:buSzPts val="1400"/>
               <a:buFont typeface="Arial"/>
               <a:buNone/>
-              <a:defRPr sz="1800" b="0" i="0" u="none" strike="noStrike" cap="none">
+              <a:defRPr sz="2000" b="0" i="0" u="none" strike="noStrike" cap="none">
                 <a:solidFill>
                   <a:schemeClr val="dk1"/>
                 </a:solidFill>
@@ -436,7 +436,7 @@
               <a:buSzPts val="1400"/>
               <a:buFont typeface="Arial"/>
               <a:buNone/>
-              <a:defRPr sz="1800" b="0" i="0" u="none" strike="noStrike" cap="none">
+              <a:defRPr sz="2000" b="0" i="0" u="none" strike="noStrike" cap="none">
                 <a:solidFill>
                   <a:schemeClr val="dk1"/>
                 </a:solidFill>
@@ -462,7 +462,7 @@
               <a:buSzPts val="1400"/>
               <a:buFont typeface="Arial"/>
               <a:buNone/>
-              <a:defRPr sz="1800" b="0" i="0" u="none" strike="noStrike" cap="none">
+              <a:defRPr sz="2000" b="0" i="0" u="none" strike="noStrike" cap="none">
                 <a:solidFill>
                   <a:schemeClr val="dk1"/>
                 </a:solidFill>
@@ -488,7 +488,7 @@
               <a:buSzPts val="1400"/>
               <a:buFont typeface="Arial"/>
               <a:buNone/>
-              <a:defRPr sz="1800" b="0" i="0" u="none" strike="noStrike" cap="none">
+              <a:defRPr sz="2000" b="0" i="0" u="none" strike="noStrike" cap="none">
                 <a:solidFill>
                   <a:schemeClr val="dk1"/>
                 </a:solidFill>
@@ -514,7 +514,7 @@
               <a:buSzPts val="1400"/>
               <a:buFont typeface="Arial"/>
               <a:buNone/>
-              <a:defRPr sz="1800" b="0" i="0" u="none" strike="noStrike" cap="none">
+              <a:defRPr sz="2000" b="0" i="0" u="none" strike="noStrike" cap="none">
                 <a:solidFill>
                   <a:schemeClr val="dk1"/>
                 </a:solidFill>
@@ -540,7 +540,7 @@
               <a:buSzPts val="1400"/>
               <a:buFont typeface="Arial"/>
               <a:buNone/>
-              <a:defRPr sz="1800" b="0" i="0" u="none" strike="noStrike" cap="none">
+              <a:defRPr sz="2000" b="0" i="0" u="none" strike="noStrike" cap="none">
                 <a:solidFill>
                   <a:schemeClr val="dk1"/>
                 </a:solidFill>
@@ -568,8 +568,8 @@
         </p:nvSpPr>
         <p:spPr>
           <a:xfrm>
-            <a:off x="3884613" y="0"/>
-            <a:ext cx="2971800" cy="457200"/>
+            <a:off x="4023992" y="0"/>
+            <a:ext cx="3078427" cy="511731"/>
           </a:xfrm>
           <a:prstGeom prst="rect">
             <a:avLst/>
@@ -580,7 +580,7 @@
           </a:ln>
         </p:spPr>
         <p:txBody>
-          <a:bodyPr spcFirstLastPara="1" wrap="square" lIns="91425" tIns="45700" rIns="91425" bIns="45700" anchor="t" anchorCtr="0">
+          <a:bodyPr spcFirstLastPara="1" wrap="square" lIns="99059" tIns="49516" rIns="99059" bIns="49516" anchor="t" anchorCtr="0">
             <a:noAutofit/>
           </a:bodyPr>
           <a:lstStyle>
@@ -600,7 +600,7 @@
               <a:buSzPts val="1400"/>
               <a:buFont typeface="Arial"/>
               <a:buNone/>
-              <a:defRPr sz="1200" b="0" i="0" u="none" strike="noStrike" cap="none">
+              <a:defRPr sz="1300" b="0" i="0" u="none" strike="noStrike" cap="none">
                 <a:solidFill>
                   <a:schemeClr val="dk1"/>
                 </a:solidFill>
@@ -626,7 +626,7 @@
               <a:buSzPts val="1400"/>
               <a:buFont typeface="Arial"/>
               <a:buNone/>
-              <a:defRPr sz="1800" b="0" i="0" u="none" strike="noStrike" cap="none">
+              <a:defRPr sz="2000" b="0" i="0" u="none" strike="noStrike" cap="none">
                 <a:solidFill>
                   <a:schemeClr val="dk1"/>
                 </a:solidFill>
@@ -652,7 +652,7 @@
               <a:buSzPts val="1400"/>
               <a:buFont typeface="Arial"/>
               <a:buNone/>
-              <a:defRPr sz="1800" b="0" i="0" u="none" strike="noStrike" cap="none">
+              <a:defRPr sz="2000" b="0" i="0" u="none" strike="noStrike" cap="none">
                 <a:solidFill>
                   <a:schemeClr val="dk1"/>
                 </a:solidFill>
@@ -678,7 +678,7 @@
               <a:buSzPts val="1400"/>
               <a:buFont typeface="Arial"/>
               <a:buNone/>
-              <a:defRPr sz="1800" b="0" i="0" u="none" strike="noStrike" cap="none">
+              <a:defRPr sz="2000" b="0" i="0" u="none" strike="noStrike" cap="none">
                 <a:solidFill>
                   <a:schemeClr val="dk1"/>
                 </a:solidFill>
@@ -704,7 +704,7 @@
               <a:buSzPts val="1400"/>
               <a:buFont typeface="Arial"/>
               <a:buNone/>
-              <a:defRPr sz="1800" b="0" i="0" u="none" strike="noStrike" cap="none">
+              <a:defRPr sz="2000" b="0" i="0" u="none" strike="noStrike" cap="none">
                 <a:solidFill>
                   <a:schemeClr val="dk1"/>
                 </a:solidFill>
@@ -730,7 +730,7 @@
               <a:buSzPts val="1400"/>
               <a:buFont typeface="Arial"/>
               <a:buNone/>
-              <a:defRPr sz="1800" b="0" i="0" u="none" strike="noStrike" cap="none">
+              <a:defRPr sz="2000" b="0" i="0" u="none" strike="noStrike" cap="none">
                 <a:solidFill>
                   <a:schemeClr val="dk1"/>
                 </a:solidFill>
@@ -756,7 +756,7 @@
               <a:buSzPts val="1400"/>
               <a:buFont typeface="Arial"/>
               <a:buNone/>
-              <a:defRPr sz="1800" b="0" i="0" u="none" strike="noStrike" cap="none">
+              <a:defRPr sz="2000" b="0" i="0" u="none" strike="noStrike" cap="none">
                 <a:solidFill>
                   <a:schemeClr val="dk1"/>
                 </a:solidFill>
@@ -782,7 +782,7 @@
               <a:buSzPts val="1400"/>
               <a:buFont typeface="Arial"/>
               <a:buNone/>
-              <a:defRPr sz="1800" b="0" i="0" u="none" strike="noStrike" cap="none">
+              <a:defRPr sz="2000" b="0" i="0" u="none" strike="noStrike" cap="none">
                 <a:solidFill>
                   <a:schemeClr val="dk1"/>
                 </a:solidFill>
@@ -808,7 +808,7 @@
               <a:buSzPts val="1400"/>
               <a:buFont typeface="Arial"/>
               <a:buNone/>
-              <a:defRPr sz="1800" b="0" i="0" u="none" strike="noStrike" cap="none">
+              <a:defRPr sz="2000" b="0" i="0" u="none" strike="noStrike" cap="none">
                 <a:solidFill>
                   <a:schemeClr val="dk1"/>
                 </a:solidFill>
@@ -836,8 +836,8 @@
         </p:nvSpPr>
         <p:spPr>
           <a:xfrm>
-            <a:off x="1143000" y="685800"/>
-            <a:ext cx="4572000" cy="3429000"/>
+            <a:off x="995363" y="768350"/>
+            <a:ext cx="5113337" cy="3836988"/>
           </a:xfrm>
           <a:custGeom>
             <a:avLst/>
@@ -887,8 +887,8 @@
         </p:nvSpPr>
         <p:spPr>
           <a:xfrm>
-            <a:off x="685800" y="4343400"/>
-            <a:ext cx="5486400" cy="4114800"/>
+            <a:off x="710407" y="4861441"/>
+            <a:ext cx="5683250" cy="4605576"/>
           </a:xfrm>
           <a:prstGeom prst="rect">
             <a:avLst/>
@@ -899,7 +899,7 @@
           </a:ln>
         </p:spPr>
         <p:txBody>
-          <a:bodyPr spcFirstLastPara="1" wrap="square" lIns="91425" tIns="45700" rIns="91425" bIns="45700" anchor="t" anchorCtr="0">
+          <a:bodyPr spcFirstLastPara="1" wrap="square" lIns="99059" tIns="49516" rIns="99059" bIns="49516" anchor="t" anchorCtr="0">
             <a:noAutofit/>
           </a:bodyPr>
           <a:lstStyle>
@@ -1155,8 +1155,8 @@
         </p:nvSpPr>
         <p:spPr>
           <a:xfrm>
-            <a:off x="0" y="8685213"/>
-            <a:ext cx="2971800" cy="457200"/>
+            <a:off x="0" y="9721106"/>
+            <a:ext cx="3078427" cy="511731"/>
           </a:xfrm>
           <a:prstGeom prst="rect">
             <a:avLst/>
@@ -1167,7 +1167,7 @@
           </a:ln>
         </p:spPr>
         <p:txBody>
-          <a:bodyPr spcFirstLastPara="1" wrap="square" lIns="91425" tIns="45700" rIns="91425" bIns="45700" anchor="b" anchorCtr="0">
+          <a:bodyPr spcFirstLastPara="1" wrap="square" lIns="99059" tIns="49516" rIns="99059" bIns="49516" anchor="b" anchorCtr="0">
             <a:noAutofit/>
           </a:bodyPr>
           <a:lstStyle>
@@ -1187,7 +1187,7 @@
               <a:buSzPts val="1400"/>
               <a:buFont typeface="Arial"/>
               <a:buNone/>
-              <a:defRPr sz="1200" b="0" i="0" u="none" strike="noStrike" cap="none">
+              <a:defRPr sz="1300" b="0" i="0" u="none" strike="noStrike" cap="none">
                 <a:solidFill>
                   <a:schemeClr val="dk1"/>
                 </a:solidFill>
@@ -1213,7 +1213,7 @@
               <a:buSzPts val="1400"/>
               <a:buFont typeface="Arial"/>
               <a:buNone/>
-              <a:defRPr sz="1800" b="0" i="0" u="none" strike="noStrike" cap="none">
+              <a:defRPr sz="2000" b="0" i="0" u="none" strike="noStrike" cap="none">
                 <a:solidFill>
                   <a:schemeClr val="dk1"/>
                 </a:solidFill>
@@ -1239,7 +1239,7 @@
               <a:buSzPts val="1400"/>
               <a:buFont typeface="Arial"/>
               <a:buNone/>
-              <a:defRPr sz="1800" b="0" i="0" u="none" strike="noStrike" cap="none">
+              <a:defRPr sz="2000" b="0" i="0" u="none" strike="noStrike" cap="none">
                 <a:solidFill>
                   <a:schemeClr val="dk1"/>
                 </a:solidFill>
@@ -1265,7 +1265,7 @@
               <a:buSzPts val="1400"/>
               <a:buFont typeface="Arial"/>
               <a:buNone/>
-              <a:defRPr sz="1800" b="0" i="0" u="none" strike="noStrike" cap="none">
+              <a:defRPr sz="2000" b="0" i="0" u="none" strike="noStrike" cap="none">
                 <a:solidFill>
                   <a:schemeClr val="dk1"/>
                 </a:solidFill>
@@ -1291,7 +1291,7 @@
               <a:buSzPts val="1400"/>
               <a:buFont typeface="Arial"/>
               <a:buNone/>
-              <a:defRPr sz="1800" b="0" i="0" u="none" strike="noStrike" cap="none">
+              <a:defRPr sz="2000" b="0" i="0" u="none" strike="noStrike" cap="none">
                 <a:solidFill>
                   <a:schemeClr val="dk1"/>
                 </a:solidFill>
@@ -1317,7 +1317,7 @@
               <a:buSzPts val="1400"/>
               <a:buFont typeface="Arial"/>
               <a:buNone/>
-              <a:defRPr sz="1800" b="0" i="0" u="none" strike="noStrike" cap="none">
+              <a:defRPr sz="2000" b="0" i="0" u="none" strike="noStrike" cap="none">
                 <a:solidFill>
                   <a:schemeClr val="dk1"/>
                 </a:solidFill>
@@ -1343,7 +1343,7 @@
               <a:buSzPts val="1400"/>
               <a:buFont typeface="Arial"/>
               <a:buNone/>
-              <a:defRPr sz="1800" b="0" i="0" u="none" strike="noStrike" cap="none">
+              <a:defRPr sz="2000" b="0" i="0" u="none" strike="noStrike" cap="none">
                 <a:solidFill>
                   <a:schemeClr val="dk1"/>
                 </a:solidFill>
@@ -1369,7 +1369,7 @@
               <a:buSzPts val="1400"/>
               <a:buFont typeface="Arial"/>
               <a:buNone/>
-              <a:defRPr sz="1800" b="0" i="0" u="none" strike="noStrike" cap="none">
+              <a:defRPr sz="2000" b="0" i="0" u="none" strike="noStrike" cap="none">
                 <a:solidFill>
                   <a:schemeClr val="dk1"/>
                 </a:solidFill>
@@ -1395,7 +1395,7 @@
               <a:buSzPts val="1400"/>
               <a:buFont typeface="Arial"/>
               <a:buNone/>
-              <a:defRPr sz="1800" b="0" i="0" u="none" strike="noStrike" cap="none">
+              <a:defRPr sz="2000" b="0" i="0" u="none" strike="noStrike" cap="none">
                 <a:solidFill>
                   <a:schemeClr val="dk1"/>
                 </a:solidFill>
@@ -1423,8 +1423,8 @@
         </p:nvSpPr>
         <p:spPr>
           <a:xfrm>
-            <a:off x="3884613" y="8685213"/>
-            <a:ext cx="2971800" cy="457200"/>
+            <a:off x="4023992" y="9721106"/>
+            <a:ext cx="3078427" cy="511731"/>
           </a:xfrm>
           <a:prstGeom prst="rect">
             <a:avLst/>
@@ -1435,30 +1435,16 @@
           </a:ln>
         </p:spPr>
         <p:txBody>
-          <a:bodyPr spcFirstLastPara="1" wrap="square" lIns="91425" tIns="45700" rIns="91425" bIns="45700" anchor="b" anchorCtr="0">
+          <a:bodyPr spcFirstLastPara="1" wrap="square" lIns="99059" tIns="49516" rIns="99059" bIns="49516" anchor="b" anchorCtr="0">
             <a:noAutofit/>
           </a:bodyPr>
           <a:lstStyle/>
           <a:p>
-            <a:pPr marL="0" marR="0" lvl="0" indent="0" algn="r" rtl="0">
-              <a:lnSpc>
-                <a:spcPct val="100000"/>
-              </a:lnSpc>
-              <a:spcBef>
-                <a:spcPts val="0"/>
-              </a:spcBef>
-              <a:spcAft>
-                <a:spcPts val="0"/>
-              </a:spcAft>
-              <a:buClr>
-                <a:srgbClr val="000000"/>
-              </a:buClr>
+            <a:pPr algn="r">
               <a:buSzPts val="1200"/>
-              <a:buFont typeface="Arial"/>
-              <a:buNone/>
             </a:pPr>
             <a:fld id="{00000000-1234-1234-1234-123412341234}" type="slidenum">
-              <a:rPr lang="en-AU" sz="1200" b="0" i="0" u="none" strike="noStrike" cap="none">
+              <a:rPr lang="en-AU" sz="1300" smtClean="0">
                 <a:solidFill>
                   <a:schemeClr val="dk1"/>
                 </a:solidFill>
@@ -1467,9 +1453,12 @@
                 <a:cs typeface="Calibri"/>
                 <a:sym typeface="Calibri"/>
               </a:rPr>
+              <a:pPr algn="r">
+                <a:buSzPts val="1200"/>
+              </a:pPr>
               <a:t>‹#›</a:t>
             </a:fld>
-            <a:endParaRPr sz="1200" b="0" i="0" u="none" strike="noStrike" cap="none">
+            <a:endParaRPr lang="en-AU" sz="1300">
               <a:solidFill>
                 <a:schemeClr val="dk1"/>
               </a:solidFill>
@@ -1745,8 +1734,8 @@
         </p:nvSpPr>
         <p:spPr>
           <a:xfrm>
-            <a:off x="6042320" y="9493393"/>
-            <a:ext cx="169918" cy="184666"/>
+            <a:off x="6259116" y="10625679"/>
+            <a:ext cx="176015" cy="206691"/>
           </a:xfrm>
           <a:prstGeom prst="rect">
             <a:avLst/>
@@ -1757,41 +1746,22 @@
           </a:ln>
         </p:spPr>
         <p:txBody>
-          <a:bodyPr spcFirstLastPara="1" wrap="square" lIns="91425" tIns="45700" rIns="91425" bIns="45700" anchor="b" anchorCtr="0">
+          <a:bodyPr spcFirstLastPara="1" wrap="square" lIns="99059" tIns="49516" rIns="99059" bIns="49516" anchor="b" anchorCtr="0">
             <a:noAutofit/>
           </a:bodyPr>
           <a:lstStyle/>
           <a:p>
-            <a:pPr marL="0" marR="0" lvl="0" indent="0" algn="r" rtl="0">
-              <a:lnSpc>
-                <a:spcPct val="100000"/>
-              </a:lnSpc>
-              <a:spcBef>
-                <a:spcPts val="0"/>
-              </a:spcBef>
-              <a:spcAft>
-                <a:spcPts val="0"/>
-              </a:spcAft>
-              <a:buClr>
-                <a:srgbClr val="000000"/>
-              </a:buClr>
+            <a:pPr algn="r">
               <a:buSzPts val="1800"/>
-              <a:buFont typeface="Calibri"/>
-              <a:buNone/>
             </a:pPr>
             <a:fld id="{00000000-1234-1234-1234-123412341234}" type="slidenum">
-              <a:rPr lang="en-AU" sz="1800" b="0" i="0" u="none" strike="noStrike" cap="none">
-                <a:solidFill>
-                  <a:srgbClr val="000000"/>
-                </a:solidFill>
-              </a:rPr>
+              <a:rPr lang="en-AU" sz="2000"/>
+              <a:pPr algn="r">
+                <a:buSzPts val="1800"/>
+              </a:pPr>
               <a:t>1</a:t>
             </a:fld>
-            <a:endParaRPr sz="1800" b="0" i="0" u="none" strike="noStrike" cap="none">
-              <a:solidFill>
-                <a:srgbClr val="000000"/>
-              </a:solidFill>
-            </a:endParaRPr>
+            <a:endParaRPr sz="2000"/>
           </a:p>
         </p:txBody>
       </p:sp>
@@ -1807,8 +1777,8 @@
         </p:nvSpPr>
         <p:spPr>
           <a:xfrm>
-            <a:off x="-2319338" y="1265238"/>
-            <a:ext cx="11201401" cy="8401050"/>
+            <a:off x="-2868613" y="1416050"/>
+            <a:ext cx="12536488" cy="9402763"/>
           </a:xfrm>
           <a:custGeom>
             <a:avLst/>
@@ -1852,8 +1822,8 @@
         </p:nvSpPr>
         <p:spPr>
           <a:xfrm>
-            <a:off x="789535" y="605318"/>
-            <a:ext cx="5470797" cy="246221"/>
+            <a:off x="817864" y="677515"/>
+            <a:ext cx="5667088" cy="275588"/>
           </a:xfrm>
           <a:prstGeom prst="rect">
             <a:avLst/>
@@ -1864,34 +1834,18 @@
           </a:ln>
         </p:spPr>
         <p:txBody>
-          <a:bodyPr spcFirstLastPara="1" wrap="square" lIns="91425" tIns="45700" rIns="91425" bIns="45700" anchor="t" anchorCtr="0">
+          <a:bodyPr spcFirstLastPara="1" wrap="square" lIns="99059" tIns="49516" rIns="99059" bIns="49516" anchor="t" anchorCtr="0">
             <a:noAutofit/>
           </a:bodyPr>
           <a:lstStyle/>
           <a:p>
-            <a:pPr marL="0" marR="0" lvl="0" indent="0" algn="l" rtl="0">
-              <a:lnSpc>
-                <a:spcPct val="100000"/>
-              </a:lnSpc>
-              <a:spcBef>
-                <a:spcPts val="0"/>
-              </a:spcBef>
-              <a:spcAft>
-                <a:spcPts val="0"/>
-              </a:spcAft>
-              <a:buClr>
-                <a:srgbClr val="000000"/>
-              </a:buClr>
-              <a:buSzPts val="1400"/>
-              <a:buFont typeface="Arial"/>
-              <a:buNone/>
-            </a:pPr>
+            <a:pPr marL="0" indent="0"/>
             <a:r>
               <a:rPr lang="en-AU" b="1"/>
               <a:t>Hypothesis: </a:t>
             </a:r>
             <a:r>
-              <a:rPr lang="en-AU" sz="1200" b="0" i="1" u="none" strike="noStrike" cap="none">
+              <a:rPr lang="en-AU" sz="1300" i="1">
                 <a:solidFill>
                   <a:srgbClr val="000000"/>
                 </a:solidFill>
@@ -1903,7 +1857,7 @@
               <a:t>Create a Hypothesis with an emphasis on SMART principles. </a:t>
             </a:r>
             <a:r>
-              <a:rPr lang="en-AU" sz="1200" b="1" i="1" u="none" strike="noStrike" cap="none">
+              <a:rPr lang="en-AU" sz="1300" b="1" i="1">
                 <a:solidFill>
                   <a:srgbClr val="000000"/>
                 </a:solidFill>
@@ -1915,105 +1869,53 @@
               <a:t>(</a:t>
             </a:r>
             <a:r>
-              <a:rPr lang="en-AU" sz="1200" b="1" i="1"/>
+              <a:rPr lang="en-AU" sz="1300" b="1" i="1"/>
               <a:t>S – Specific, M – Measurable, A – Achievable, R – Realistic, T – Timebound). </a:t>
             </a:r>
             <a:r>
-              <a:rPr lang="en-AU" sz="1200" b="0" i="0"/>
+              <a:rPr lang="en-AU" sz="1300"/>
               <a:t>If you cannot do this, you </a:t>
             </a:r>
             <a:r>
-              <a:rPr lang="en-AU" sz="1200" b="1" i="0"/>
+              <a:rPr lang="en-AU" sz="1300" b="1"/>
               <a:t>do not</a:t>
             </a:r>
             <a:r>
-              <a:rPr lang="en-AU" sz="1200" b="0" i="0"/>
+              <a:rPr lang="en-AU" sz="1300"/>
               <a:t> have a good grasp on the business problem.</a:t>
             </a:r>
             <a:endParaRPr b="1"/>
           </a:p>
           <a:p>
-            <a:pPr marL="0" lvl="0" indent="0" algn="l" rtl="0">
-              <a:lnSpc>
-                <a:spcPct val="100000"/>
-              </a:lnSpc>
-              <a:spcBef>
-                <a:spcPts val="0"/>
-              </a:spcBef>
-              <a:spcAft>
-                <a:spcPts val="0"/>
-              </a:spcAft>
-              <a:buSzPts val="1400"/>
-              <a:buNone/>
-            </a:pPr>
+            <a:pPr marL="0" indent="0"/>
             <a:endParaRPr/>
           </a:p>
           <a:p>
-            <a:pPr marL="0" marR="0" lvl="0" indent="0" algn="l" rtl="0">
-              <a:lnSpc>
-                <a:spcPct val="100000"/>
-              </a:lnSpc>
-              <a:spcBef>
-                <a:spcPts val="0"/>
-              </a:spcBef>
-              <a:spcAft>
-                <a:spcPts val="0"/>
-              </a:spcAft>
-              <a:buClr>
-                <a:srgbClr val="000000"/>
-              </a:buClr>
-              <a:buSzPts val="1400"/>
-              <a:buFont typeface="Arial"/>
-              <a:buNone/>
-            </a:pPr>
+            <a:pPr marL="0" indent="0"/>
             <a:r>
               <a:rPr lang="en-AU" b="1"/>
               <a:t>Context: </a:t>
             </a:r>
             <a:r>
-              <a:rPr lang="en-AU" sz="1200"/>
+              <a:rPr lang="en-AU" sz="1300"/>
               <a:t>With context, we have </a:t>
             </a:r>
             <a:r>
-              <a:rPr lang="en-AU" sz="1200" b="1" u="sng"/>
+              <a:rPr lang="en-AU" sz="1300" b="1" u="sng"/>
               <a:t>clearly identified the problem at hand </a:t>
             </a:r>
             <a:r>
-              <a:rPr lang="en-AU" sz="1200"/>
+              <a:rPr lang="en-AU" sz="1300"/>
               <a:t>and have elucidated on how our initiative may solve this problem, alongside the commercial implications this will have on the business. </a:t>
             </a:r>
             <a:endParaRPr/>
           </a:p>
           <a:p>
-            <a:pPr marL="0" lvl="0" indent="0" algn="l" rtl="0">
-              <a:lnSpc>
-                <a:spcPct val="100000"/>
-              </a:lnSpc>
-              <a:spcBef>
-                <a:spcPts val="0"/>
-              </a:spcBef>
-              <a:spcAft>
-                <a:spcPts val="0"/>
-              </a:spcAft>
-              <a:buSzPts val="1400"/>
-              <a:buNone/>
-            </a:pPr>
+            <a:pPr marL="0" indent="0"/>
             <a:endParaRPr b="1"/>
           </a:p>
           <a:p>
-            <a:pPr marL="0" lvl="0" indent="0" algn="l" rtl="0">
-              <a:lnSpc>
-                <a:spcPct val="100000"/>
-              </a:lnSpc>
-              <a:spcBef>
-                <a:spcPts val="0"/>
-              </a:spcBef>
-              <a:spcAft>
-                <a:spcPts val="0"/>
-              </a:spcAft>
-              <a:buSzPts val="1400"/>
-              <a:buNone/>
-            </a:pPr>
+            <a:pPr marL="0" indent="0"/>
             <a:r>
               <a:rPr lang="en-AU" b="1"/>
               <a:t>Criteria for Success</a:t>
@@ -2025,35 +1927,11 @@
             <a:endParaRPr/>
           </a:p>
           <a:p>
-            <a:pPr marL="0" lvl="0" indent="0" algn="l" rtl="0">
-              <a:lnSpc>
-                <a:spcPct val="100000"/>
-              </a:lnSpc>
-              <a:spcBef>
-                <a:spcPts val="0"/>
-              </a:spcBef>
-              <a:spcAft>
-                <a:spcPts val="0"/>
-              </a:spcAft>
-              <a:buSzPts val="1400"/>
-              <a:buNone/>
-            </a:pPr>
+            <a:pPr marL="0" indent="0"/>
             <a:endParaRPr b="0"/>
           </a:p>
           <a:p>
-            <a:pPr marL="0" lvl="0" indent="0" algn="l" rtl="0">
-              <a:lnSpc>
-                <a:spcPct val="100000"/>
-              </a:lnSpc>
-              <a:spcBef>
-                <a:spcPts val="0"/>
-              </a:spcBef>
-              <a:spcAft>
-                <a:spcPts val="0"/>
-              </a:spcAft>
-              <a:buSzPts val="1400"/>
-              <a:buNone/>
-            </a:pPr>
+            <a:pPr marL="0" indent="0"/>
             <a:r>
               <a:rPr lang="en-AU" b="1"/>
               <a:t>Scope of Solution Space: </a:t>
@@ -2065,35 +1943,11 @@
             <a:endParaRPr/>
           </a:p>
           <a:p>
-            <a:pPr marL="0" lvl="0" indent="0" algn="l" rtl="0">
-              <a:lnSpc>
-                <a:spcPct val="100000"/>
-              </a:lnSpc>
-              <a:spcBef>
-                <a:spcPts val="0"/>
-              </a:spcBef>
-              <a:spcAft>
-                <a:spcPts val="0"/>
-              </a:spcAft>
-              <a:buSzPts val="1400"/>
-              <a:buNone/>
-            </a:pPr>
+            <a:pPr marL="0" indent="0"/>
             <a:endParaRPr b="0"/>
           </a:p>
           <a:p>
-            <a:pPr marL="0" lvl="0" indent="0" algn="l" rtl="0">
-              <a:lnSpc>
-                <a:spcPct val="100000"/>
-              </a:lnSpc>
-              <a:spcBef>
-                <a:spcPts val="0"/>
-              </a:spcBef>
-              <a:spcAft>
-                <a:spcPts val="0"/>
-              </a:spcAft>
-              <a:buSzPts val="1400"/>
-              <a:buNone/>
-            </a:pPr>
+            <a:pPr marL="0" indent="0"/>
             <a:r>
               <a:rPr lang="en-AU" b="1"/>
               <a:t>Constraints within Solution Space: </a:t>
@@ -2105,35 +1959,11 @@
             <a:endParaRPr/>
           </a:p>
           <a:p>
-            <a:pPr marL="0" lvl="0" indent="0" algn="l" rtl="0">
-              <a:lnSpc>
-                <a:spcPct val="100000"/>
-              </a:lnSpc>
-              <a:spcBef>
-                <a:spcPts val="0"/>
-              </a:spcBef>
-              <a:spcAft>
-                <a:spcPts val="0"/>
-              </a:spcAft>
-              <a:buSzPts val="1400"/>
-              <a:buNone/>
-            </a:pPr>
+            <a:pPr marL="0" indent="0"/>
             <a:endParaRPr b="0"/>
           </a:p>
           <a:p>
-            <a:pPr marL="0" lvl="0" indent="0" algn="l" rtl="0">
-              <a:lnSpc>
-                <a:spcPct val="100000"/>
-              </a:lnSpc>
-              <a:spcBef>
-                <a:spcPts val="0"/>
-              </a:spcBef>
-              <a:spcAft>
-                <a:spcPts val="0"/>
-              </a:spcAft>
-              <a:buSzPts val="1400"/>
-              <a:buNone/>
-            </a:pPr>
+            <a:pPr marL="0" indent="0"/>
             <a:r>
               <a:rPr lang="en-AU" b="1"/>
               <a:t>Stakeholders to provide key insight: </a:t>
@@ -2145,35 +1975,11 @@
             <a:endParaRPr/>
           </a:p>
           <a:p>
-            <a:pPr marL="0" lvl="0" indent="0" algn="l" rtl="0">
-              <a:lnSpc>
-                <a:spcPct val="100000"/>
-              </a:lnSpc>
-              <a:spcBef>
-                <a:spcPts val="0"/>
-              </a:spcBef>
-              <a:spcAft>
-                <a:spcPts val="0"/>
-              </a:spcAft>
-              <a:buSzPts val="1400"/>
-              <a:buNone/>
-            </a:pPr>
+            <a:pPr marL="0" indent="0"/>
             <a:endParaRPr b="0"/>
           </a:p>
           <a:p>
-            <a:pPr marL="0" lvl="0" indent="0" algn="l" rtl="0">
-              <a:lnSpc>
-                <a:spcPct val="100000"/>
-              </a:lnSpc>
-              <a:spcBef>
-                <a:spcPts val="0"/>
-              </a:spcBef>
-              <a:spcAft>
-                <a:spcPts val="0"/>
-              </a:spcAft>
-              <a:buSzPts val="1400"/>
-              <a:buNone/>
-            </a:pPr>
+            <a:pPr marL="0" indent="0"/>
             <a:r>
               <a:rPr lang="en-AU" b="1"/>
               <a:t>What key data sources are required</a:t>
@@ -2185,19 +1991,7 @@
             <a:endParaRPr/>
           </a:p>
           <a:p>
-            <a:pPr marL="0" lvl="0" indent="0" algn="l" rtl="0">
-              <a:lnSpc>
-                <a:spcPct val="100000"/>
-              </a:lnSpc>
-              <a:spcBef>
-                <a:spcPts val="0"/>
-              </a:spcBef>
-              <a:spcAft>
-                <a:spcPts val="0"/>
-              </a:spcAft>
-              <a:buSzPts val="1400"/>
-              <a:buNone/>
-            </a:pPr>
+            <a:pPr marL="0" indent="0"/>
             <a:r>
               <a:rPr lang="en-AU" b="0"/>
               <a:t>Based off my discussions with the key stakeholders – can we clearly list out all the data sources we need so we can make a highly targeted request as opposed to a scatter-gun approach where we ask for a bit of everything?</a:t>
@@ -2205,35 +1999,11 @@
             <a:endParaRPr/>
           </a:p>
           <a:p>
-            <a:pPr marL="0" lvl="0" indent="0" algn="l" rtl="0">
-              <a:lnSpc>
-                <a:spcPct val="100000"/>
-              </a:lnSpc>
-              <a:spcBef>
-                <a:spcPts val="0"/>
-              </a:spcBef>
-              <a:spcAft>
-                <a:spcPts val="0"/>
-              </a:spcAft>
-              <a:buSzPts val="1400"/>
-              <a:buNone/>
-            </a:pPr>
+            <a:pPr marL="0" indent="0"/>
             <a:endParaRPr b="1"/>
           </a:p>
           <a:p>
-            <a:pPr marL="0" lvl="0" indent="0" algn="l" rtl="0">
-              <a:lnSpc>
-                <a:spcPct val="100000"/>
-              </a:lnSpc>
-              <a:spcBef>
-                <a:spcPts val="0"/>
-              </a:spcBef>
-              <a:spcAft>
-                <a:spcPts val="0"/>
-              </a:spcAft>
-              <a:buSzPts val="1400"/>
-              <a:buNone/>
-            </a:pPr>
+            <a:pPr marL="0" indent="0"/>
             <a:endParaRPr b="1"/>
           </a:p>
         </p:txBody>
@@ -4298,7 +4068,7 @@
         </p:nvSpPr>
         <p:spPr>
           <a:xfrm>
-            <a:off x="517188" y="3669489"/>
+            <a:off x="550325" y="3649104"/>
             <a:ext cx="3597454" cy="224203"/>
           </a:xfrm>
           <a:prstGeom prst="rect">
@@ -4707,7 +4477,7 @@
         <p:spPr>
           <a:xfrm>
             <a:off x="143108" y="1964976"/>
-            <a:ext cx="4324418" cy="1245854"/>
+            <a:ext cx="4324418" cy="1565644"/>
           </a:xfrm>
           <a:prstGeom prst="rect">
             <a:avLst/>
@@ -4736,8 +4506,8 @@
               <a:buNone/>
             </a:pPr>
             <a:r>
-              <a:rPr lang="en-AU" sz="1070" b="1" dirty="0"/>
-              <a:t>Boba joints are popular in the Bay. The store owner would like to find out if time is the current store operating hours for all seasons, or should the store have seasonal hours to improve profit by 10% or more.</a:t>
+              <a:rPr lang="en-AU" sz="1200" b="1" dirty="0"/>
+              <a:t>Boba joints are popular in the Bay Area. Super Cue would like to find out if implementing seasonal hours can help improve profit by 10% or more.</a:t>
             </a:r>
           </a:p>
           <a:p>
@@ -4754,7 +4524,7 @@
               <a:buNone/>
             </a:pPr>
             <a:r>
-              <a:rPr lang="en-AU" sz="1070" b="1" dirty="0"/>
+              <a:rPr lang="en-AU" sz="1200" b="1" dirty="0"/>
               <a:t>Null: All sales are due to chance, time is not a dependent variable for sales.</a:t>
             </a:r>
           </a:p>
@@ -4772,7 +4542,7 @@
               <a:buNone/>
             </a:pPr>
             <a:r>
-              <a:rPr lang="en-AU" sz="1070" b="1" dirty="0"/>
+              <a:rPr lang="en-AU" sz="1200" b="1" dirty="0"/>
               <a:t>Alternative: Time can be used to predict sales, and thus the store should operate based on times that produce profit.</a:t>
             </a:r>
           </a:p>
@@ -4816,7 +4586,7 @@
               <a:buNone/>
             </a:pPr>
             <a:r>
-              <a:rPr lang="en-US" sz="1071" b="1" i="0" u="none" strike="noStrike" cap="none" dirty="0">
+              <a:rPr lang="en-US" sz="1200" b="1" i="0" u="none" strike="noStrike" cap="none" dirty="0">
                 <a:solidFill>
                   <a:srgbClr val="000000"/>
                 </a:solidFill>
@@ -4828,11 +4598,11 @@
               <a:t>Find out if time is a good variable to predict sales, if it </a:t>
             </a:r>
             <a:r>
-              <a:rPr lang="en-US" sz="1071" b="1" dirty="0"/>
+              <a:rPr lang="en-US" sz="1200" b="1" dirty="0"/>
               <a:t>is</a:t>
             </a:r>
             <a:r>
-              <a:rPr lang="en-US" sz="1071" b="1" i="0" u="none" strike="noStrike" cap="none" dirty="0">
+              <a:rPr lang="en-US" sz="1200" b="1" i="0" u="none" strike="noStrike" cap="none" dirty="0">
                 <a:solidFill>
                   <a:srgbClr val="000000"/>
                 </a:solidFill>
@@ -4844,10 +4614,10 @@
               <a:t>, a new store operation hours should be implemented before the schools start again</a:t>
             </a:r>
             <a:r>
-              <a:rPr lang="en-US" sz="1071" b="1" dirty="0"/>
+              <a:rPr lang="en-US" sz="1200" b="1" dirty="0"/>
               <a:t>, along with staff recommendation.</a:t>
             </a:r>
-            <a:endParaRPr sz="1071" b="1" i="0" u="none" strike="noStrike" cap="none" dirty="0">
+            <a:endParaRPr sz="1200" b="1" i="0" u="none" strike="noStrike" cap="none" dirty="0">
               <a:solidFill>
                 <a:srgbClr val="000000"/>
               </a:solidFill>
@@ -4868,7 +4638,7 @@
         <p:spPr>
           <a:xfrm>
             <a:off x="186843" y="4999594"/>
-            <a:ext cx="4324418" cy="1137079"/>
+            <a:ext cx="4324418" cy="1257482"/>
           </a:xfrm>
           <a:prstGeom prst="rect">
             <a:avLst/>
@@ -4887,7 +4657,7 @@
             <a:pPr lvl="0"/>
             <a:r>
               <a:rPr lang="en-US" sz="1071" b="1" dirty="0"/>
-              <a:t>Use the 2017 hourly sale data provided to find if time is a good variable to predict sales. If it is, provide the optimal open/close hours, and staffing. Note: for each $50 sales, only one staff member is needed, but at no time should the store have only one staff member working. If the hourly sales doesn’t reach $40, the store will be losing money, and should be closed.</a:t>
+              <a:t>Use the 2016&amp;2017 hourly sales data provided to find if time is a good variable to predict sales. If it is, provide the optimal open/close hours, and staffing. Note: for each $50 sales, only one staff member is needed, but at no time should the store have only one staff member working. If the hourly sales doesn’t reach $40, the store will be losing money, and should be closed.</a:t>
             </a:r>
           </a:p>
         </p:txBody>

</xml_diff>